<commit_message>
Updated plots in ppt; downloaded colab notebooks used for ablation study and regularization investigation
</commit_message>
<xml_diff>
--- a/reports/2021.11.25 - Diffusion investigation plots.pptx
+++ b/reports/2021.11.25 - Diffusion investigation plots.pptx
@@ -17,6 +17,7 @@
     <p:sldId id="267" r:id="rId11"/>
     <p:sldId id="268" r:id="rId12"/>
     <p:sldId id="269" r:id="rId13"/>
+    <p:sldId id="271" r:id="rId14"/>
   </p:sldIdLst>
   <p:sldSz cx="12192000" cy="6858000"/>
   <p:notesSz cx="6858000" cy="9144000"/>
@@ -115,7 +116,443 @@
       </a:defRPr>
     </a:lvl9pPr>
   </p:defaultTextStyle>
+  <p:extLst>
+    <p:ext uri="{EFAFB233-063F-42B5-8137-9DF3F51BA10A}">
+      <p15:sldGuideLst xmlns:p15="http://schemas.microsoft.com/office/powerpoint/2012/main"/>
+    </p:ext>
+  </p:extLst>
 </p:presentation>
+</file>
+
+<file path=ppt/changesInfos/changesInfo1.xml><?xml version="1.0" encoding="utf-8"?>
+<pc:chgInfo xmlns:a="http://schemas.openxmlformats.org/drawingml/2006/main" xmlns:r="http://schemas.openxmlformats.org/officeDocument/2006/relationships" xmlns:ac="http://schemas.microsoft.com/office/drawing/2013/main/command" xmlns:pc="http://schemas.microsoft.com/office/powerpoint/2013/main/command">
+  <pc:docChgLst>
+    <pc:chgData name="Kevin Hare" userId="53a035b79ed0a90b" providerId="LiveId" clId="{587F225C-5C52-443A-9BFA-3CDEDB2DD5D0}"/>
+    <pc:docChg chg="addSld delSld modSld">
+      <pc:chgData name="Kevin Hare" userId="53a035b79ed0a90b" providerId="LiveId" clId="{587F225C-5C52-443A-9BFA-3CDEDB2DD5D0}" dt="2021-12-07T19:52:12.488" v="103" actId="1076"/>
+      <pc:docMkLst>
+        <pc:docMk/>
+      </pc:docMkLst>
+      <pc:sldChg chg="addSp delSp modSp mod">
+        <pc:chgData name="Kevin Hare" userId="53a035b79ed0a90b" providerId="LiveId" clId="{587F225C-5C52-443A-9BFA-3CDEDB2DD5D0}" dt="2021-12-07T19:00:00.237" v="22" actId="20577"/>
+        <pc:sldMkLst>
+          <pc:docMk/>
+          <pc:sldMk cId="1402200014" sldId="258"/>
+        </pc:sldMkLst>
+        <pc:spChg chg="mod">
+          <ac:chgData name="Kevin Hare" userId="53a035b79ed0a90b" providerId="LiveId" clId="{587F225C-5C52-443A-9BFA-3CDEDB2DD5D0}" dt="2021-12-07T19:00:00.237" v="22" actId="20577"/>
+          <ac:spMkLst>
+            <pc:docMk/>
+            <pc:sldMk cId="1402200014" sldId="258"/>
+            <ac:spMk id="2" creationId="{80BEBE9E-F1AC-4DAE-9CA8-D9C248F86DAB}"/>
+          </ac:spMkLst>
+        </pc:spChg>
+        <pc:picChg chg="add mod">
+          <ac:chgData name="Kevin Hare" userId="53a035b79ed0a90b" providerId="LiveId" clId="{587F225C-5C52-443A-9BFA-3CDEDB2DD5D0}" dt="2021-12-07T18:59:54.713" v="2" actId="1076"/>
+          <ac:picMkLst>
+            <pc:docMk/>
+            <pc:sldMk cId="1402200014" sldId="258"/>
+            <ac:picMk id="1026" creationId="{B7E09C3A-12F8-4077-B916-50F8BC201196}"/>
+          </ac:picMkLst>
+        </pc:picChg>
+        <pc:picChg chg="del">
+          <ac:chgData name="Kevin Hare" userId="53a035b79ed0a90b" providerId="LiveId" clId="{587F225C-5C52-443A-9BFA-3CDEDB2DD5D0}" dt="2021-12-07T18:59:47.743" v="0" actId="478"/>
+          <ac:picMkLst>
+            <pc:docMk/>
+            <pc:sldMk cId="1402200014" sldId="258"/>
+            <ac:picMk id="1028" creationId="{540E881C-F607-4056-A86F-62AB1FE5D1DA}"/>
+          </ac:picMkLst>
+        </pc:picChg>
+      </pc:sldChg>
+      <pc:sldChg chg="addSp delSp modSp mod">
+        <pc:chgData name="Kevin Hare" userId="53a035b79ed0a90b" providerId="LiveId" clId="{587F225C-5C52-443A-9BFA-3CDEDB2DD5D0}" dt="2021-12-07T19:00:34.721" v="29" actId="1076"/>
+        <pc:sldMkLst>
+          <pc:docMk/>
+          <pc:sldMk cId="4267575577" sldId="259"/>
+        </pc:sldMkLst>
+        <pc:spChg chg="mod">
+          <ac:chgData name="Kevin Hare" userId="53a035b79ed0a90b" providerId="LiveId" clId="{587F225C-5C52-443A-9BFA-3CDEDB2DD5D0}" dt="2021-12-07T19:00:04.191" v="23"/>
+          <ac:spMkLst>
+            <pc:docMk/>
+            <pc:sldMk cId="4267575577" sldId="259"/>
+            <ac:spMk id="2" creationId="{80BEBE9E-F1AC-4DAE-9CA8-D9C248F86DAB}"/>
+          </ac:spMkLst>
+        </pc:spChg>
+        <pc:picChg chg="add mod">
+          <ac:chgData name="Kevin Hare" userId="53a035b79ed0a90b" providerId="LiveId" clId="{587F225C-5C52-443A-9BFA-3CDEDB2DD5D0}" dt="2021-12-07T19:00:34.721" v="29" actId="1076"/>
+          <ac:picMkLst>
+            <pc:docMk/>
+            <pc:sldMk cId="4267575577" sldId="259"/>
+            <ac:picMk id="3" creationId="{35F0C5EB-0469-4C31-8F98-F9D1B164D793}"/>
+          </ac:picMkLst>
+        </pc:picChg>
+        <pc:picChg chg="del">
+          <ac:chgData name="Kevin Hare" userId="53a035b79ed0a90b" providerId="LiveId" clId="{587F225C-5C52-443A-9BFA-3CDEDB2DD5D0}" dt="2021-12-07T19:00:29.365" v="27" actId="478"/>
+          <ac:picMkLst>
+            <pc:docMk/>
+            <pc:sldMk cId="4267575577" sldId="259"/>
+            <ac:picMk id="2050" creationId="{FBCF2C89-903F-483E-A1E2-85A7138DBE55}"/>
+          </ac:picMkLst>
+        </pc:picChg>
+      </pc:sldChg>
+      <pc:sldChg chg="addSp delSp modSp mod">
+        <pc:chgData name="Kevin Hare" userId="53a035b79ed0a90b" providerId="LiveId" clId="{587F225C-5C52-443A-9BFA-3CDEDB2DD5D0}" dt="2021-12-07T19:01:01.633" v="32" actId="1076"/>
+        <pc:sldMkLst>
+          <pc:docMk/>
+          <pc:sldMk cId="1242897924" sldId="260"/>
+        </pc:sldMkLst>
+        <pc:spChg chg="mod">
+          <ac:chgData name="Kevin Hare" userId="53a035b79ed0a90b" providerId="LiveId" clId="{587F225C-5C52-443A-9BFA-3CDEDB2DD5D0}" dt="2021-12-07T19:00:06.565" v="24"/>
+          <ac:spMkLst>
+            <pc:docMk/>
+            <pc:sldMk cId="1242897924" sldId="260"/>
+            <ac:spMk id="2" creationId="{80BEBE9E-F1AC-4DAE-9CA8-D9C248F86DAB}"/>
+          </ac:spMkLst>
+        </pc:spChg>
+        <pc:picChg chg="add mod">
+          <ac:chgData name="Kevin Hare" userId="53a035b79ed0a90b" providerId="LiveId" clId="{587F225C-5C52-443A-9BFA-3CDEDB2DD5D0}" dt="2021-12-07T19:01:01.633" v="32" actId="1076"/>
+          <ac:picMkLst>
+            <pc:docMk/>
+            <pc:sldMk cId="1242897924" sldId="260"/>
+            <ac:picMk id="3" creationId="{705540C7-DE92-46A9-938F-509C246576FD}"/>
+          </ac:picMkLst>
+        </pc:picChg>
+        <pc:picChg chg="del">
+          <ac:chgData name="Kevin Hare" userId="53a035b79ed0a90b" providerId="LiveId" clId="{587F225C-5C52-443A-9BFA-3CDEDB2DD5D0}" dt="2021-12-07T19:00:50.349" v="30" actId="478"/>
+          <ac:picMkLst>
+            <pc:docMk/>
+            <pc:sldMk cId="1242897924" sldId="260"/>
+            <ac:picMk id="3074" creationId="{05BE1902-42F0-4CC6-A410-D26E6AD20151}"/>
+          </ac:picMkLst>
+        </pc:picChg>
+      </pc:sldChg>
+      <pc:sldChg chg="addSp delSp modSp mod">
+        <pc:chgData name="Kevin Hare" userId="53a035b79ed0a90b" providerId="LiveId" clId="{587F225C-5C52-443A-9BFA-3CDEDB2DD5D0}" dt="2021-12-07T19:21:06.330" v="39" actId="1076"/>
+        <pc:sldMkLst>
+          <pc:docMk/>
+          <pc:sldMk cId="3016786973" sldId="261"/>
+        </pc:sldMkLst>
+        <pc:spChg chg="mod">
+          <ac:chgData name="Kevin Hare" userId="53a035b79ed0a90b" providerId="LiveId" clId="{587F225C-5C52-443A-9BFA-3CDEDB2DD5D0}" dt="2021-12-07T19:00:08.728" v="25"/>
+          <ac:spMkLst>
+            <pc:docMk/>
+            <pc:sldMk cId="3016786973" sldId="261"/>
+            <ac:spMk id="2" creationId="{80BEBE9E-F1AC-4DAE-9CA8-D9C248F86DAB}"/>
+          </ac:spMkLst>
+        </pc:spChg>
+        <pc:picChg chg="del">
+          <ac:chgData name="Kevin Hare" userId="53a035b79ed0a90b" providerId="LiveId" clId="{587F225C-5C52-443A-9BFA-3CDEDB2DD5D0}" dt="2021-12-07T19:21:03.564" v="37" actId="478"/>
+          <ac:picMkLst>
+            <pc:docMk/>
+            <pc:sldMk cId="3016786973" sldId="261"/>
+            <ac:picMk id="4098" creationId="{744B2B70-CD76-4658-AC85-D403761E4659}"/>
+          </ac:picMkLst>
+        </pc:picChg>
+        <pc:picChg chg="add del">
+          <ac:chgData name="Kevin Hare" userId="53a035b79ed0a90b" providerId="LiveId" clId="{587F225C-5C52-443A-9BFA-3CDEDB2DD5D0}" dt="2021-12-07T19:21:03.564" v="37" actId="478"/>
+          <ac:picMkLst>
+            <pc:docMk/>
+            <pc:sldMk cId="3016786973" sldId="261"/>
+            <ac:picMk id="5122" creationId="{659D72D0-BE70-4654-9B00-B4C3AC9EB7F5}"/>
+          </ac:picMkLst>
+        </pc:picChg>
+        <pc:picChg chg="add mod">
+          <ac:chgData name="Kevin Hare" userId="53a035b79ed0a90b" providerId="LiveId" clId="{587F225C-5C52-443A-9BFA-3CDEDB2DD5D0}" dt="2021-12-07T19:21:06.330" v="39" actId="1076"/>
+          <ac:picMkLst>
+            <pc:docMk/>
+            <pc:sldMk cId="3016786973" sldId="261"/>
+            <ac:picMk id="5124" creationId="{6063226E-BEAB-4409-99B5-EF51119733D9}"/>
+          </ac:picMkLst>
+        </pc:picChg>
+      </pc:sldChg>
+      <pc:sldChg chg="addSp delSp modSp mod">
+        <pc:chgData name="Kevin Hare" userId="53a035b79ed0a90b" providerId="LiveId" clId="{587F225C-5C52-443A-9BFA-3CDEDB2DD5D0}" dt="2021-12-07T19:20:50.901" v="35" actId="1076"/>
+        <pc:sldMkLst>
+          <pc:docMk/>
+          <pc:sldMk cId="2508013675" sldId="262"/>
+        </pc:sldMkLst>
+        <pc:spChg chg="mod">
+          <ac:chgData name="Kevin Hare" userId="53a035b79ed0a90b" providerId="LiveId" clId="{587F225C-5C52-443A-9BFA-3CDEDB2DD5D0}" dt="2021-12-07T19:00:11.092" v="26"/>
+          <ac:spMkLst>
+            <pc:docMk/>
+            <pc:sldMk cId="2508013675" sldId="262"/>
+            <ac:spMk id="2" creationId="{80BEBE9E-F1AC-4DAE-9CA8-D9C248F86DAB}"/>
+          </ac:spMkLst>
+        </pc:spChg>
+        <pc:picChg chg="add mod">
+          <ac:chgData name="Kevin Hare" userId="53a035b79ed0a90b" providerId="LiveId" clId="{587F225C-5C52-443A-9BFA-3CDEDB2DD5D0}" dt="2021-12-07T19:20:50.901" v="35" actId="1076"/>
+          <ac:picMkLst>
+            <pc:docMk/>
+            <pc:sldMk cId="2508013675" sldId="262"/>
+            <ac:picMk id="4098" creationId="{711A255D-B488-4A9A-9DF3-C7075A63F786}"/>
+          </ac:picMkLst>
+        </pc:picChg>
+        <pc:picChg chg="del">
+          <ac:chgData name="Kevin Hare" userId="53a035b79ed0a90b" providerId="LiveId" clId="{587F225C-5C52-443A-9BFA-3CDEDB2DD5D0}" dt="2021-12-07T19:20:38.055" v="33" actId="478"/>
+          <ac:picMkLst>
+            <pc:docMk/>
+            <pc:sldMk cId="2508013675" sldId="262"/>
+            <ac:picMk id="5122" creationId="{A5D4C941-6BEF-475F-A9C3-F54F63CBD48F}"/>
+          </ac:picMkLst>
+        </pc:picChg>
+      </pc:sldChg>
+      <pc:sldChg chg="addSp delSp modSp">
+        <pc:chgData name="Kevin Hare" userId="53a035b79ed0a90b" providerId="LiveId" clId="{587F225C-5C52-443A-9BFA-3CDEDB2DD5D0}" dt="2021-12-07T19:43:45.424" v="63" actId="1076"/>
+        <pc:sldMkLst>
+          <pc:docMk/>
+          <pc:sldMk cId="2882445590" sldId="263"/>
+        </pc:sldMkLst>
+        <pc:picChg chg="add del mod">
+          <ac:chgData name="Kevin Hare" userId="53a035b79ed0a90b" providerId="LiveId" clId="{587F225C-5C52-443A-9BFA-3CDEDB2DD5D0}" dt="2021-12-07T19:41:29.091" v="42" actId="478"/>
+          <ac:picMkLst>
+            <pc:docMk/>
+            <pc:sldMk cId="2882445590" sldId="263"/>
+            <ac:picMk id="3" creationId="{4E710B8A-5E45-471C-A19F-B3E794966FF2}"/>
+          </ac:picMkLst>
+        </pc:picChg>
+        <pc:picChg chg="del mod">
+          <ac:chgData name="Kevin Hare" userId="53a035b79ed0a90b" providerId="LiveId" clId="{587F225C-5C52-443A-9BFA-3CDEDB2DD5D0}" dt="2021-12-07T19:41:29.091" v="42" actId="478"/>
+          <ac:picMkLst>
+            <pc:docMk/>
+            <pc:sldMk cId="2882445590" sldId="263"/>
+            <ac:picMk id="6146" creationId="{104C795F-6CF2-4AFC-82FC-97D36F5015BC}"/>
+          </ac:picMkLst>
+        </pc:picChg>
+        <pc:picChg chg="add del mod">
+          <ac:chgData name="Kevin Hare" userId="53a035b79ed0a90b" providerId="LiveId" clId="{587F225C-5C52-443A-9BFA-3CDEDB2DD5D0}" dt="2021-12-07T19:41:32.914" v="45" actId="478"/>
+          <ac:picMkLst>
+            <pc:docMk/>
+            <pc:sldMk cId="2882445590" sldId="263"/>
+            <ac:picMk id="6148" creationId="{F5D874B0-C883-48BE-9427-A78D4F533176}"/>
+          </ac:picMkLst>
+        </pc:picChg>
+        <pc:picChg chg="add del mod">
+          <ac:chgData name="Kevin Hare" userId="53a035b79ed0a90b" providerId="LiveId" clId="{587F225C-5C52-443A-9BFA-3CDEDB2DD5D0}" dt="2021-12-07T19:43:16.773" v="53" actId="478"/>
+          <ac:picMkLst>
+            <pc:docMk/>
+            <pc:sldMk cId="2882445590" sldId="263"/>
+            <ac:picMk id="6150" creationId="{124A510A-6599-47F5-9845-596304043028}"/>
+          </ac:picMkLst>
+        </pc:picChg>
+        <pc:picChg chg="add del mod">
+          <ac:chgData name="Kevin Hare" userId="53a035b79ed0a90b" providerId="LiveId" clId="{587F225C-5C52-443A-9BFA-3CDEDB2DD5D0}" dt="2021-12-07T19:43:36.714" v="58" actId="478"/>
+          <ac:picMkLst>
+            <pc:docMk/>
+            <pc:sldMk cId="2882445590" sldId="263"/>
+            <ac:picMk id="6152" creationId="{AC0B9E21-00A1-4F66-A638-F2CB1697D674}"/>
+          </ac:picMkLst>
+        </pc:picChg>
+        <pc:picChg chg="add mod">
+          <ac:chgData name="Kevin Hare" userId="53a035b79ed0a90b" providerId="LiveId" clId="{587F225C-5C52-443A-9BFA-3CDEDB2DD5D0}" dt="2021-12-07T19:43:45.424" v="63" actId="1076"/>
+          <ac:picMkLst>
+            <pc:docMk/>
+            <pc:sldMk cId="2882445590" sldId="263"/>
+            <ac:picMk id="6154" creationId="{DEF45A8B-0FE5-49BA-8F02-D2C2813FA2F8}"/>
+          </ac:picMkLst>
+        </pc:picChg>
+      </pc:sldChg>
+      <pc:sldChg chg="addSp delSp modSp">
+        <pc:chgData name="Kevin Hare" userId="53a035b79ed0a90b" providerId="LiveId" clId="{587F225C-5C52-443A-9BFA-3CDEDB2DD5D0}" dt="2021-12-07T19:42:59.416" v="52" actId="1076"/>
+        <pc:sldMkLst>
+          <pc:docMk/>
+          <pc:sldMk cId="1225422060" sldId="264"/>
+        </pc:sldMkLst>
+        <pc:picChg chg="add mod">
+          <ac:chgData name="Kevin Hare" userId="53a035b79ed0a90b" providerId="LiveId" clId="{587F225C-5C52-443A-9BFA-3CDEDB2DD5D0}" dt="2021-12-07T19:42:59.416" v="52" actId="1076"/>
+          <ac:picMkLst>
+            <pc:docMk/>
+            <pc:sldMk cId="1225422060" sldId="264"/>
+            <ac:picMk id="3" creationId="{5E4AA011-BFD8-4D2C-BBB6-BF235559AB43}"/>
+          </ac:picMkLst>
+        </pc:picChg>
+        <pc:picChg chg="del">
+          <ac:chgData name="Kevin Hare" userId="53a035b79ed0a90b" providerId="LiveId" clId="{587F225C-5C52-443A-9BFA-3CDEDB2DD5D0}" dt="2021-12-07T19:42:55.518" v="49" actId="478"/>
+          <ac:picMkLst>
+            <pc:docMk/>
+            <pc:sldMk cId="1225422060" sldId="264"/>
+            <ac:picMk id="7170" creationId="{E61F79F3-BAA6-4B9F-85E2-AFFD32F45B42}"/>
+          </ac:picMkLst>
+        </pc:picChg>
+      </pc:sldChg>
+      <pc:sldChg chg="addSp delSp modSp">
+        <pc:chgData name="Kevin Hare" userId="53a035b79ed0a90b" providerId="LiveId" clId="{587F225C-5C52-443A-9BFA-3CDEDB2DD5D0}" dt="2021-12-07T19:50:57.976" v="91" actId="1076"/>
+        <pc:sldMkLst>
+          <pc:docMk/>
+          <pc:sldMk cId="2483909747" sldId="265"/>
+        </pc:sldMkLst>
+        <pc:picChg chg="del">
+          <ac:chgData name="Kevin Hare" userId="53a035b79ed0a90b" providerId="LiveId" clId="{587F225C-5C52-443A-9BFA-3CDEDB2DD5D0}" dt="2021-12-07T19:49:47.688" v="74" actId="478"/>
+          <ac:picMkLst>
+            <pc:docMk/>
+            <pc:sldMk cId="2483909747" sldId="265"/>
+            <ac:picMk id="8194" creationId="{DE41EA7C-0478-4D1E-9F42-2BE9F2927C44}"/>
+          </ac:picMkLst>
+        </pc:picChg>
+        <pc:picChg chg="add del">
+          <ac:chgData name="Kevin Hare" userId="53a035b79ed0a90b" providerId="LiveId" clId="{587F225C-5C52-443A-9BFA-3CDEDB2DD5D0}" dt="2021-12-07T19:49:48.943" v="76" actId="478"/>
+          <ac:picMkLst>
+            <pc:docMk/>
+            <pc:sldMk cId="2483909747" sldId="265"/>
+            <ac:picMk id="9218" creationId="{37090463-403C-41D4-9E97-18C9D1CD4A1E}"/>
+          </ac:picMkLst>
+        </pc:picChg>
+        <pc:picChg chg="add del mod">
+          <ac:chgData name="Kevin Hare" userId="53a035b79ed0a90b" providerId="LiveId" clId="{587F225C-5C52-443A-9BFA-3CDEDB2DD5D0}" dt="2021-12-07T19:50:35.896" v="85" actId="478"/>
+          <ac:picMkLst>
+            <pc:docMk/>
+            <pc:sldMk cId="2483909747" sldId="265"/>
+            <ac:picMk id="9220" creationId="{C2250973-65BB-4AD2-BBC2-3E82EC0C3644}"/>
+          </ac:picMkLst>
+        </pc:picChg>
+        <pc:picChg chg="add del mod">
+          <ac:chgData name="Kevin Hare" userId="53a035b79ed0a90b" providerId="LiveId" clId="{587F225C-5C52-443A-9BFA-3CDEDB2DD5D0}" dt="2021-12-07T19:50:54.291" v="89" actId="478"/>
+          <ac:picMkLst>
+            <pc:docMk/>
+            <pc:sldMk cId="2483909747" sldId="265"/>
+            <ac:picMk id="9222" creationId="{C5021270-8750-425A-80C9-E88567B6AB97}"/>
+          </ac:picMkLst>
+        </pc:picChg>
+        <pc:picChg chg="add mod">
+          <ac:chgData name="Kevin Hare" userId="53a035b79ed0a90b" providerId="LiveId" clId="{587F225C-5C52-443A-9BFA-3CDEDB2DD5D0}" dt="2021-12-07T19:50:57.976" v="91" actId="1076"/>
+          <ac:picMkLst>
+            <pc:docMk/>
+            <pc:sldMk cId="2483909747" sldId="265"/>
+            <ac:picMk id="9224" creationId="{75A2A548-9DBB-4A84-9717-30576638C807}"/>
+          </ac:picMkLst>
+        </pc:picChg>
+      </pc:sldChg>
+      <pc:sldChg chg="addSp delSp modSp">
+        <pc:chgData name="Kevin Hare" userId="53a035b79ed0a90b" providerId="LiveId" clId="{587F225C-5C52-443A-9BFA-3CDEDB2DD5D0}" dt="2021-12-07T19:51:14.819" v="94" actId="1076"/>
+        <pc:sldMkLst>
+          <pc:docMk/>
+          <pc:sldMk cId="292131954" sldId="266"/>
+        </pc:sldMkLst>
+        <pc:picChg chg="del">
+          <ac:chgData name="Kevin Hare" userId="53a035b79ed0a90b" providerId="LiveId" clId="{587F225C-5C52-443A-9BFA-3CDEDB2DD5D0}" dt="2021-12-07T19:51:11.463" v="92" actId="478"/>
+          <ac:picMkLst>
+            <pc:docMk/>
+            <pc:sldMk cId="292131954" sldId="266"/>
+            <ac:picMk id="9218" creationId="{359388E3-4469-4D17-8436-19B00DC19B80}"/>
+          </ac:picMkLst>
+        </pc:picChg>
+        <pc:picChg chg="add mod">
+          <ac:chgData name="Kevin Hare" userId="53a035b79ed0a90b" providerId="LiveId" clId="{587F225C-5C52-443A-9BFA-3CDEDB2DD5D0}" dt="2021-12-07T19:51:14.819" v="94" actId="1076"/>
+          <ac:picMkLst>
+            <pc:docMk/>
+            <pc:sldMk cId="292131954" sldId="266"/>
+            <ac:picMk id="10242" creationId="{BB516385-4C2D-41EA-AE9B-3DFF2A6FEB49}"/>
+          </ac:picMkLst>
+        </pc:picChg>
+      </pc:sldChg>
+      <pc:sldChg chg="addSp delSp modSp">
+        <pc:chgData name="Kevin Hare" userId="53a035b79ed0a90b" providerId="LiveId" clId="{587F225C-5C52-443A-9BFA-3CDEDB2DD5D0}" dt="2021-12-07T19:51:31.661" v="97" actId="1076"/>
+        <pc:sldMkLst>
+          <pc:docMk/>
+          <pc:sldMk cId="344891070" sldId="267"/>
+        </pc:sldMkLst>
+        <pc:picChg chg="del">
+          <ac:chgData name="Kevin Hare" userId="53a035b79ed0a90b" providerId="LiveId" clId="{587F225C-5C52-443A-9BFA-3CDEDB2DD5D0}" dt="2021-12-07T19:51:27.876" v="95" actId="478"/>
+          <ac:picMkLst>
+            <pc:docMk/>
+            <pc:sldMk cId="344891070" sldId="267"/>
+            <ac:picMk id="10242" creationId="{43B24BF4-3882-4991-B3DD-186DB53ADC45}"/>
+          </ac:picMkLst>
+        </pc:picChg>
+        <pc:picChg chg="add mod">
+          <ac:chgData name="Kevin Hare" userId="53a035b79ed0a90b" providerId="LiveId" clId="{587F225C-5C52-443A-9BFA-3CDEDB2DD5D0}" dt="2021-12-07T19:51:31.661" v="97" actId="1076"/>
+          <ac:picMkLst>
+            <pc:docMk/>
+            <pc:sldMk cId="344891070" sldId="267"/>
+            <ac:picMk id="11266" creationId="{82A1CA3B-A73F-4E40-8561-CABD84370EFF}"/>
+          </ac:picMkLst>
+        </pc:picChg>
+      </pc:sldChg>
+      <pc:sldChg chg="addSp delSp modSp">
+        <pc:chgData name="Kevin Hare" userId="53a035b79ed0a90b" providerId="LiveId" clId="{587F225C-5C52-443A-9BFA-3CDEDB2DD5D0}" dt="2021-12-07T19:51:55.312" v="100" actId="1076"/>
+        <pc:sldMkLst>
+          <pc:docMk/>
+          <pc:sldMk cId="767594860" sldId="268"/>
+        </pc:sldMkLst>
+        <pc:picChg chg="del">
+          <ac:chgData name="Kevin Hare" userId="53a035b79ed0a90b" providerId="LiveId" clId="{587F225C-5C52-443A-9BFA-3CDEDB2DD5D0}" dt="2021-12-07T19:51:51.822" v="98" actId="478"/>
+          <ac:picMkLst>
+            <pc:docMk/>
+            <pc:sldMk cId="767594860" sldId="268"/>
+            <ac:picMk id="11266" creationId="{ED92BE90-E883-4953-A563-C8D27C96E18E}"/>
+          </ac:picMkLst>
+        </pc:picChg>
+        <pc:picChg chg="add mod">
+          <ac:chgData name="Kevin Hare" userId="53a035b79ed0a90b" providerId="LiveId" clId="{587F225C-5C52-443A-9BFA-3CDEDB2DD5D0}" dt="2021-12-07T19:51:55.312" v="100" actId="1076"/>
+          <ac:picMkLst>
+            <pc:docMk/>
+            <pc:sldMk cId="767594860" sldId="268"/>
+            <ac:picMk id="12290" creationId="{9BA050AB-9933-40FA-BCC2-9241F5AD250B}"/>
+          </ac:picMkLst>
+        </pc:picChg>
+      </pc:sldChg>
+      <pc:sldChg chg="addSp delSp modSp">
+        <pc:chgData name="Kevin Hare" userId="53a035b79ed0a90b" providerId="LiveId" clId="{587F225C-5C52-443A-9BFA-3CDEDB2DD5D0}" dt="2021-12-07T19:52:12.488" v="103" actId="1076"/>
+        <pc:sldMkLst>
+          <pc:docMk/>
+          <pc:sldMk cId="1613995504" sldId="269"/>
+        </pc:sldMkLst>
+        <pc:picChg chg="del">
+          <ac:chgData name="Kevin Hare" userId="53a035b79ed0a90b" providerId="LiveId" clId="{587F225C-5C52-443A-9BFA-3CDEDB2DD5D0}" dt="2021-12-07T19:52:08.990" v="101" actId="478"/>
+          <ac:picMkLst>
+            <pc:docMk/>
+            <pc:sldMk cId="1613995504" sldId="269"/>
+            <ac:picMk id="12290" creationId="{F5BA1060-E1C0-4423-A214-A6F3C6A21C7D}"/>
+          </ac:picMkLst>
+        </pc:picChg>
+        <pc:picChg chg="add mod">
+          <ac:chgData name="Kevin Hare" userId="53a035b79ed0a90b" providerId="LiveId" clId="{587F225C-5C52-443A-9BFA-3CDEDB2DD5D0}" dt="2021-12-07T19:52:12.488" v="103" actId="1076"/>
+          <ac:picMkLst>
+            <pc:docMk/>
+            <pc:sldMk cId="1613995504" sldId="269"/>
+            <ac:picMk id="13314" creationId="{923785A6-E842-41D1-98F2-25E5C44D1960}"/>
+          </ac:picMkLst>
+        </pc:picChg>
+      </pc:sldChg>
+      <pc:sldChg chg="new del">
+        <pc:chgData name="Kevin Hare" userId="53a035b79ed0a90b" providerId="LiveId" clId="{587F225C-5C52-443A-9BFA-3CDEDB2DD5D0}" dt="2021-12-07T19:48:47.088" v="69" actId="47"/>
+        <pc:sldMkLst>
+          <pc:docMk/>
+          <pc:sldMk cId="3978683860" sldId="270"/>
+        </pc:sldMkLst>
+      </pc:sldChg>
+      <pc:sldChg chg="addSp delSp modSp add">
+        <pc:chgData name="Kevin Hare" userId="53a035b79ed0a90b" providerId="LiveId" clId="{587F225C-5C52-443A-9BFA-3CDEDB2DD5D0}" dt="2021-12-07T19:49:08.156" v="73" actId="1076"/>
+        <pc:sldMkLst>
+          <pc:docMk/>
+          <pc:sldMk cId="4026835770" sldId="271"/>
+        </pc:sldMkLst>
+        <pc:picChg chg="add mod">
+          <ac:chgData name="Kevin Hare" userId="53a035b79ed0a90b" providerId="LiveId" clId="{587F225C-5C52-443A-9BFA-3CDEDB2DD5D0}" dt="2021-12-07T19:49:08.156" v="73" actId="1076"/>
+          <ac:picMkLst>
+            <pc:docMk/>
+            <pc:sldMk cId="4026835770" sldId="271"/>
+            <ac:picMk id="8194" creationId="{1E555FA3-CE12-4DA5-BF83-1AC5112C731E}"/>
+          </ac:picMkLst>
+        </pc:picChg>
+        <pc:picChg chg="del">
+          <ac:chgData name="Kevin Hare" userId="53a035b79ed0a90b" providerId="LiveId" clId="{587F225C-5C52-443A-9BFA-3CDEDB2DD5D0}" dt="2021-12-07T19:48:43.030" v="66" actId="478"/>
+          <ac:picMkLst>
+            <pc:docMk/>
+            <pc:sldMk cId="4026835770" sldId="271"/>
+            <ac:picMk id="12290" creationId="{F5BA1060-E1C0-4423-A214-A6F3C6A21C7D}"/>
+          </ac:picMkLst>
+        </pc:picChg>
+      </pc:sldChg>
+      <pc:sldChg chg="add del">
+        <pc:chgData name="Kevin Hare" userId="53a035b79ed0a90b" providerId="LiveId" clId="{587F225C-5C52-443A-9BFA-3CDEDB2DD5D0}" dt="2021-12-07T19:48:45.986" v="68" actId="47"/>
+        <pc:sldMkLst>
+          <pc:docMk/>
+          <pc:sldMk cId="3214296862" sldId="272"/>
+        </pc:sldMkLst>
+      </pc:sldChg>
+    </pc:docChg>
+  </pc:docChgLst>
+</pc:chgInfo>
 </file>
 
 <file path=ppt/slideLayouts/slideLayout1.xml><?xml version="1.0" encoding="utf-8"?>
@@ -265,7 +702,7 @@
           <a:p>
             <a:fld id="{0168E904-A464-4FA2-967A-2D65ADDDB780}" type="datetimeFigureOut">
               <a:rPr lang="en-US" smtClean="0"/>
-              <a:t>11/24/2021</a:t>
+              <a:t>12/7/2021</a:t>
             </a:fld>
             <a:endParaRPr lang="en-US"/>
           </a:p>
@@ -463,7 +900,7 @@
           <a:p>
             <a:fld id="{0168E904-A464-4FA2-967A-2D65ADDDB780}" type="datetimeFigureOut">
               <a:rPr lang="en-US" smtClean="0"/>
-              <a:t>11/24/2021</a:t>
+              <a:t>12/7/2021</a:t>
             </a:fld>
             <a:endParaRPr lang="en-US"/>
           </a:p>
@@ -671,7 +1108,7 @@
           <a:p>
             <a:fld id="{0168E904-A464-4FA2-967A-2D65ADDDB780}" type="datetimeFigureOut">
               <a:rPr lang="en-US" smtClean="0"/>
-              <a:t>11/24/2021</a:t>
+              <a:t>12/7/2021</a:t>
             </a:fld>
             <a:endParaRPr lang="en-US"/>
           </a:p>
@@ -869,7 +1306,7 @@
           <a:p>
             <a:fld id="{0168E904-A464-4FA2-967A-2D65ADDDB780}" type="datetimeFigureOut">
               <a:rPr lang="en-US" smtClean="0"/>
-              <a:t>11/24/2021</a:t>
+              <a:t>12/7/2021</a:t>
             </a:fld>
             <a:endParaRPr lang="en-US"/>
           </a:p>
@@ -1144,7 +1581,7 @@
           <a:p>
             <a:fld id="{0168E904-A464-4FA2-967A-2D65ADDDB780}" type="datetimeFigureOut">
               <a:rPr lang="en-US" smtClean="0"/>
-              <a:t>11/24/2021</a:t>
+              <a:t>12/7/2021</a:t>
             </a:fld>
             <a:endParaRPr lang="en-US"/>
           </a:p>
@@ -1409,7 +1846,7 @@
           <a:p>
             <a:fld id="{0168E904-A464-4FA2-967A-2D65ADDDB780}" type="datetimeFigureOut">
               <a:rPr lang="en-US" smtClean="0"/>
-              <a:t>11/24/2021</a:t>
+              <a:t>12/7/2021</a:t>
             </a:fld>
             <a:endParaRPr lang="en-US"/>
           </a:p>
@@ -1821,7 +2258,7 @@
           <a:p>
             <a:fld id="{0168E904-A464-4FA2-967A-2D65ADDDB780}" type="datetimeFigureOut">
               <a:rPr lang="en-US" smtClean="0"/>
-              <a:t>11/24/2021</a:t>
+              <a:t>12/7/2021</a:t>
             </a:fld>
             <a:endParaRPr lang="en-US"/>
           </a:p>
@@ -1962,7 +2399,7 @@
           <a:p>
             <a:fld id="{0168E904-A464-4FA2-967A-2D65ADDDB780}" type="datetimeFigureOut">
               <a:rPr lang="en-US" smtClean="0"/>
-              <a:t>11/24/2021</a:t>
+              <a:t>12/7/2021</a:t>
             </a:fld>
             <a:endParaRPr lang="en-US"/>
           </a:p>
@@ -2075,7 +2512,7 @@
           <a:p>
             <a:fld id="{0168E904-A464-4FA2-967A-2D65ADDDB780}" type="datetimeFigureOut">
               <a:rPr lang="en-US" smtClean="0"/>
-              <a:t>11/24/2021</a:t>
+              <a:t>12/7/2021</a:t>
             </a:fld>
             <a:endParaRPr lang="en-US"/>
           </a:p>
@@ -2386,7 +2823,7 @@
           <a:p>
             <a:fld id="{0168E904-A464-4FA2-967A-2D65ADDDB780}" type="datetimeFigureOut">
               <a:rPr lang="en-US" smtClean="0"/>
-              <a:t>11/24/2021</a:t>
+              <a:t>12/7/2021</a:t>
             </a:fld>
             <a:endParaRPr lang="en-US"/>
           </a:p>
@@ -2674,7 +3111,7 @@
           <a:p>
             <a:fld id="{0168E904-A464-4FA2-967A-2D65ADDDB780}" type="datetimeFigureOut">
               <a:rPr lang="en-US" smtClean="0"/>
-              <a:t>11/24/2021</a:t>
+              <a:t>12/7/2021</a:t>
             </a:fld>
             <a:endParaRPr lang="en-US"/>
           </a:p>
@@ -2915,7 +3352,7 @@
           <a:p>
             <a:fld id="{0168E904-A464-4FA2-967A-2D65ADDDB780}" type="datetimeFigureOut">
               <a:rPr lang="en-US" smtClean="0"/>
-              <a:t>11/24/2021</a:t>
+              <a:t>12/7/2021</a:t>
             </a:fld>
             <a:endParaRPr lang="en-US"/>
           </a:p>
@@ -3355,17 +3792,17 @@
           <a:p>
             <a:r>
               <a:rPr lang="en-US" dirty="0"/>
-              <a:t>Hex Size = 22</a:t>
+              <a:t>22 x 22 Partitioning</a:t>
             </a:r>
           </a:p>
         </p:txBody>
       </p:sp>
       <p:pic>
         <p:nvPicPr>
-          <p:cNvPr id="1028" name="Picture 4">
-            <a:extLst>
-              <a:ext uri="{FF2B5EF4-FFF2-40B4-BE49-F238E27FC236}">
-                <a16:creationId xmlns:a16="http://schemas.microsoft.com/office/drawing/2014/main" id="{540E881C-F607-4056-A86F-62AB1FE5D1DA}"/>
+          <p:cNvPr id="1026" name="Picture 2">
+            <a:extLst>
+              <a:ext uri="{FF2B5EF4-FFF2-40B4-BE49-F238E27FC236}">
+                <a16:creationId xmlns:a16="http://schemas.microsoft.com/office/drawing/2014/main" id="{B7E09C3A-12F8-4077-B916-50F8BC201196}"/>
               </a:ext>
             </a:extLst>
           </p:cNvPr>
@@ -3389,8 +3826,8 @@
         </p:blipFill>
         <p:spPr bwMode="auto">
           <a:xfrm>
-            <a:off x="2133600" y="1690688"/>
-            <a:ext cx="7924800" cy="4572000"/>
+            <a:off x="2667000" y="1612084"/>
+            <a:ext cx="6858000" cy="4724400"/>
           </a:xfrm>
           <a:prstGeom prst="rect">
             <a:avLst/>
@@ -3467,10 +3904,10 @@
       </p:sp>
       <p:pic>
         <p:nvPicPr>
-          <p:cNvPr id="10242" name="Picture 2">
-            <a:extLst>
-              <a:ext uri="{FF2B5EF4-FFF2-40B4-BE49-F238E27FC236}">
-                <a16:creationId xmlns:a16="http://schemas.microsoft.com/office/drawing/2014/main" id="{43B24BF4-3882-4991-B3DD-186DB53ADC45}"/>
+          <p:cNvPr id="11266" name="Picture 2">
+            <a:extLst>
+              <a:ext uri="{FF2B5EF4-FFF2-40B4-BE49-F238E27FC236}">
+                <a16:creationId xmlns:a16="http://schemas.microsoft.com/office/drawing/2014/main" id="{82A1CA3B-A73F-4E40-8561-CABD84370EFF}"/>
               </a:ext>
             </a:extLst>
           </p:cNvPr>
@@ -3494,8 +3931,8 @@
         </p:blipFill>
         <p:spPr bwMode="auto">
           <a:xfrm>
-            <a:off x="2133600" y="1690688"/>
-            <a:ext cx="7924800" cy="4572000"/>
+            <a:off x="1600200" y="1690688"/>
+            <a:ext cx="8991600" cy="4724400"/>
           </a:xfrm>
           <a:prstGeom prst="rect">
             <a:avLst/>
@@ -3572,10 +4009,10 @@
       </p:sp>
       <p:pic>
         <p:nvPicPr>
-          <p:cNvPr id="11266" name="Picture 2">
-            <a:extLst>
-              <a:ext uri="{FF2B5EF4-FFF2-40B4-BE49-F238E27FC236}">
-                <a16:creationId xmlns:a16="http://schemas.microsoft.com/office/drawing/2014/main" id="{ED92BE90-E883-4953-A563-C8D27C96E18E}"/>
+          <p:cNvPr id="12290" name="Picture 2">
+            <a:extLst>
+              <a:ext uri="{FF2B5EF4-FFF2-40B4-BE49-F238E27FC236}">
+                <a16:creationId xmlns:a16="http://schemas.microsoft.com/office/drawing/2014/main" id="{9BA050AB-9933-40FA-BCC2-9241F5AD250B}"/>
               </a:ext>
             </a:extLst>
           </p:cNvPr>
@@ -3599,8 +4036,8 @@
         </p:blipFill>
         <p:spPr bwMode="auto">
           <a:xfrm>
-            <a:off x="2133600" y="1690688"/>
-            <a:ext cx="7924800" cy="4572000"/>
+            <a:off x="1499532" y="1690688"/>
+            <a:ext cx="8991600" cy="4724400"/>
           </a:xfrm>
           <a:prstGeom prst="rect">
             <a:avLst/>
@@ -3677,10 +4114,10 @@
       </p:sp>
       <p:pic>
         <p:nvPicPr>
-          <p:cNvPr id="12290" name="Picture 2">
-            <a:extLst>
-              <a:ext uri="{FF2B5EF4-FFF2-40B4-BE49-F238E27FC236}">
-                <a16:creationId xmlns:a16="http://schemas.microsoft.com/office/drawing/2014/main" id="{F5BA1060-E1C0-4423-A214-A6F3C6A21C7D}"/>
+          <p:cNvPr id="13314" name="Picture 2">
+            <a:extLst>
+              <a:ext uri="{FF2B5EF4-FFF2-40B4-BE49-F238E27FC236}">
+                <a16:creationId xmlns:a16="http://schemas.microsoft.com/office/drawing/2014/main" id="{923785A6-E842-41D1-98F2-25E5C44D1960}"/>
               </a:ext>
             </a:extLst>
           </p:cNvPr>
@@ -3704,8 +4141,8 @@
         </p:blipFill>
         <p:spPr bwMode="auto">
           <a:xfrm>
-            <a:off x="2133600" y="1690688"/>
-            <a:ext cx="7924800" cy="4572000"/>
+            <a:off x="1600200" y="1690688"/>
+            <a:ext cx="8991600" cy="4724400"/>
           </a:xfrm>
           <a:prstGeom prst="rect">
             <a:avLst/>
@@ -3735,6 +4172,111 @@
 </p:sld>
 </file>
 
+<file path=ppt/slides/slide13.xml><?xml version="1.0" encoding="utf-8"?>
+<p:sld xmlns:a="http://schemas.openxmlformats.org/drawingml/2006/main" xmlns:r="http://schemas.openxmlformats.org/officeDocument/2006/relationships" xmlns:p="http://schemas.openxmlformats.org/presentationml/2006/main">
+  <p:cSld>
+    <p:spTree>
+      <p:nvGrpSpPr>
+        <p:cNvPr id="1" name=""/>
+        <p:cNvGrpSpPr/>
+        <p:nvPr/>
+      </p:nvGrpSpPr>
+      <p:grpSpPr>
+        <a:xfrm>
+          <a:off x="0" y="0"/>
+          <a:ext cx="0" cy="0"/>
+          <a:chOff x="0" y="0"/>
+          <a:chExt cx="0" cy="0"/>
+        </a:xfrm>
+      </p:grpSpPr>
+      <p:sp>
+        <p:nvSpPr>
+          <p:cNvPr id="2" name="Title 1">
+            <a:extLst>
+              <a:ext uri="{FF2B5EF4-FFF2-40B4-BE49-F238E27FC236}">
+                <a16:creationId xmlns:a16="http://schemas.microsoft.com/office/drawing/2014/main" id="{80BEBE9E-F1AC-4DAE-9CA8-D9C248F86DAB}"/>
+              </a:ext>
+            </a:extLst>
+          </p:cNvPr>
+          <p:cNvSpPr>
+            <a:spLocks noGrp="1"/>
+          </p:cNvSpPr>
+          <p:nvPr>
+            <p:ph type="title"/>
+          </p:nvPr>
+        </p:nvSpPr>
+        <p:spPr/>
+        <p:txBody>
+          <a:bodyPr/>
+          <a:lstStyle/>
+          <a:p>
+            <a:r>
+              <a:rPr lang="en-US" dirty="0"/>
+              <a:t>Hex Size = 99</a:t>
+            </a:r>
+          </a:p>
+        </p:txBody>
+      </p:sp>
+      <p:pic>
+        <p:nvPicPr>
+          <p:cNvPr id="8194" name="Picture 2">
+            <a:extLst>
+              <a:ext uri="{FF2B5EF4-FFF2-40B4-BE49-F238E27FC236}">
+                <a16:creationId xmlns:a16="http://schemas.microsoft.com/office/drawing/2014/main" id="{1E555FA3-CE12-4DA5-BF83-1AC5112C731E}"/>
+              </a:ext>
+            </a:extLst>
+          </p:cNvPr>
+          <p:cNvPicPr>
+            <a:picLocks noChangeAspect="1" noChangeArrowheads="1"/>
+          </p:cNvPicPr>
+          <p:nvPr/>
+        </p:nvPicPr>
+        <p:blipFill>
+          <a:blip r:embed="rId2">
+            <a:extLst>
+              <a:ext uri="{28A0092B-C50C-407E-A947-70E740481C1C}">
+                <a14:useLocalDpi xmlns:a14="http://schemas.microsoft.com/office/drawing/2010/main" val="0"/>
+              </a:ext>
+            </a:extLst>
+          </a:blip>
+          <a:srcRect/>
+          <a:stretch>
+            <a:fillRect/>
+          </a:stretch>
+        </p:blipFill>
+        <p:spPr bwMode="auto">
+          <a:xfrm>
+            <a:off x="838200" y="1690688"/>
+            <a:ext cx="10427516" cy="3443253"/>
+          </a:xfrm>
+          <a:prstGeom prst="rect">
+            <a:avLst/>
+          </a:prstGeom>
+          <a:noFill/>
+          <a:extLst>
+            <a:ext uri="{909E8E84-426E-40DD-AFC4-6F175D3DCCD1}">
+              <a14:hiddenFill xmlns:a14="http://schemas.microsoft.com/office/drawing/2010/main">
+                <a:solidFill>
+                  <a:srgbClr val="FFFFFF"/>
+                </a:solidFill>
+              </a14:hiddenFill>
+            </a:ext>
+          </a:extLst>
+        </p:spPr>
+      </p:pic>
+    </p:spTree>
+    <p:extLst>
+      <p:ext uri="{BB962C8B-B14F-4D97-AF65-F5344CB8AC3E}">
+        <p14:creationId xmlns:p14="http://schemas.microsoft.com/office/powerpoint/2010/main" val="4026835770"/>
+      </p:ext>
+    </p:extLst>
+  </p:cSld>
+  <p:clrMapOvr>
+    <a:masterClrMapping/>
+  </p:clrMapOvr>
+</p:sld>
+</file>
+
 <file path=ppt/slides/slide2.xml><?xml version="1.0" encoding="utf-8"?>
 <p:sld xmlns:a="http://schemas.openxmlformats.org/drawingml/2006/main" xmlns:r="http://schemas.openxmlformats.org/officeDocument/2006/relationships" xmlns:p="http://schemas.openxmlformats.org/presentationml/2006/main">
   <p:cSld>
@@ -3775,17 +4317,17 @@
           <a:p>
             <a:r>
               <a:rPr lang="en-US" dirty="0"/>
-              <a:t>Hex Size = 22</a:t>
+              <a:t>22 x 22 Partitioning</a:t>
             </a:r>
           </a:p>
         </p:txBody>
       </p:sp>
       <p:pic>
         <p:nvPicPr>
-          <p:cNvPr id="2050" name="Picture 2">
-            <a:extLst>
-              <a:ext uri="{FF2B5EF4-FFF2-40B4-BE49-F238E27FC236}">
-                <a16:creationId xmlns:a16="http://schemas.microsoft.com/office/drawing/2014/main" id="{FBCF2C89-903F-483E-A1E2-85A7138DBE55}"/>
+          <p:cNvPr id="3" name="Picture 2">
+            <a:extLst>
+              <a:ext uri="{FF2B5EF4-FFF2-40B4-BE49-F238E27FC236}">
+                <a16:creationId xmlns:a16="http://schemas.microsoft.com/office/drawing/2014/main" id="{35F0C5EB-0469-4C31-8F98-F9D1B164D793}"/>
               </a:ext>
             </a:extLst>
           </p:cNvPr>
@@ -3809,8 +4351,8 @@
         </p:blipFill>
         <p:spPr bwMode="auto">
           <a:xfrm>
-            <a:off x="2133600" y="1690688"/>
-            <a:ext cx="7924800" cy="4572000"/>
+            <a:off x="2667000" y="1690688"/>
+            <a:ext cx="6858000" cy="4724400"/>
           </a:xfrm>
           <a:prstGeom prst="rect">
             <a:avLst/>
@@ -3880,17 +4422,17 @@
           <a:p>
             <a:r>
               <a:rPr lang="en-US" dirty="0"/>
-              <a:t>Hex Size = 22</a:t>
+              <a:t>22 x 22 Partitioning</a:t>
             </a:r>
           </a:p>
         </p:txBody>
       </p:sp>
       <p:pic>
         <p:nvPicPr>
-          <p:cNvPr id="3074" name="Picture 2">
-            <a:extLst>
-              <a:ext uri="{FF2B5EF4-FFF2-40B4-BE49-F238E27FC236}">
-                <a16:creationId xmlns:a16="http://schemas.microsoft.com/office/drawing/2014/main" id="{05BE1902-42F0-4CC6-A410-D26E6AD20151}"/>
+          <p:cNvPr id="3" name="Picture 2">
+            <a:extLst>
+              <a:ext uri="{FF2B5EF4-FFF2-40B4-BE49-F238E27FC236}">
+                <a16:creationId xmlns:a16="http://schemas.microsoft.com/office/drawing/2014/main" id="{705540C7-DE92-46A9-938F-509C246576FD}"/>
               </a:ext>
             </a:extLst>
           </p:cNvPr>
@@ -3914,8 +4456,8 @@
         </p:blipFill>
         <p:spPr bwMode="auto">
           <a:xfrm>
-            <a:off x="2133600" y="1690688"/>
-            <a:ext cx="7924800" cy="4572000"/>
+            <a:off x="2667000" y="1690688"/>
+            <a:ext cx="6858000" cy="4724400"/>
           </a:xfrm>
           <a:prstGeom prst="rect">
             <a:avLst/>
@@ -3985,17 +4527,17 @@
           <a:p>
             <a:r>
               <a:rPr lang="en-US" dirty="0"/>
-              <a:t>Hex Size = 22</a:t>
+              <a:t>22 x 22 Partitioning</a:t>
             </a:r>
           </a:p>
         </p:txBody>
       </p:sp>
       <p:pic>
         <p:nvPicPr>
-          <p:cNvPr id="4098" name="Picture 2">
-            <a:extLst>
-              <a:ext uri="{FF2B5EF4-FFF2-40B4-BE49-F238E27FC236}">
-                <a16:creationId xmlns:a16="http://schemas.microsoft.com/office/drawing/2014/main" id="{744B2B70-CD76-4658-AC85-D403761E4659}"/>
+          <p:cNvPr id="5124" name="Picture 4">
+            <a:extLst>
+              <a:ext uri="{FF2B5EF4-FFF2-40B4-BE49-F238E27FC236}">
+                <a16:creationId xmlns:a16="http://schemas.microsoft.com/office/drawing/2014/main" id="{6063226E-BEAB-4409-99B5-EF51119733D9}"/>
               </a:ext>
             </a:extLst>
           </p:cNvPr>
@@ -4019,8 +4561,8 @@
         </p:blipFill>
         <p:spPr bwMode="auto">
           <a:xfrm>
-            <a:off x="2133600" y="1690688"/>
-            <a:ext cx="7924800" cy="4572000"/>
+            <a:off x="2667000" y="1690688"/>
+            <a:ext cx="6858000" cy="4724400"/>
           </a:xfrm>
           <a:prstGeom prst="rect">
             <a:avLst/>
@@ -4090,17 +4632,17 @@
           <a:p>
             <a:r>
               <a:rPr lang="en-US" dirty="0"/>
-              <a:t>Hex Size = 22</a:t>
+              <a:t>22 x 22 Partitioning</a:t>
             </a:r>
           </a:p>
         </p:txBody>
       </p:sp>
       <p:pic>
         <p:nvPicPr>
-          <p:cNvPr id="5122" name="Picture 2">
-            <a:extLst>
-              <a:ext uri="{FF2B5EF4-FFF2-40B4-BE49-F238E27FC236}">
-                <a16:creationId xmlns:a16="http://schemas.microsoft.com/office/drawing/2014/main" id="{A5D4C941-6BEF-475F-A9C3-F54F63CBD48F}"/>
+          <p:cNvPr id="4098" name="Picture 2">
+            <a:extLst>
+              <a:ext uri="{FF2B5EF4-FFF2-40B4-BE49-F238E27FC236}">
+                <a16:creationId xmlns:a16="http://schemas.microsoft.com/office/drawing/2014/main" id="{711A255D-B488-4A9A-9DF3-C7075A63F786}"/>
               </a:ext>
             </a:extLst>
           </p:cNvPr>
@@ -4124,8 +4666,8 @@
         </p:blipFill>
         <p:spPr bwMode="auto">
           <a:xfrm>
-            <a:off x="2133600" y="1690688"/>
-            <a:ext cx="7924800" cy="4572000"/>
+            <a:off x="2667000" y="1360415"/>
+            <a:ext cx="6858000" cy="4724400"/>
           </a:xfrm>
           <a:prstGeom prst="rect">
             <a:avLst/>
@@ -4202,10 +4744,10 @@
       </p:sp>
       <p:pic>
         <p:nvPicPr>
-          <p:cNvPr id="6146" name="Picture 2">
-            <a:extLst>
-              <a:ext uri="{FF2B5EF4-FFF2-40B4-BE49-F238E27FC236}">
-                <a16:creationId xmlns:a16="http://schemas.microsoft.com/office/drawing/2014/main" id="{104C795F-6CF2-4AFC-82FC-97D36F5015BC}"/>
+          <p:cNvPr id="6154" name="Picture 10">
+            <a:extLst>
+              <a:ext uri="{FF2B5EF4-FFF2-40B4-BE49-F238E27FC236}">
+                <a16:creationId xmlns:a16="http://schemas.microsoft.com/office/drawing/2014/main" id="{DEF45A8B-0FE5-49BA-8F02-D2C2813FA2F8}"/>
               </a:ext>
             </a:extLst>
           </p:cNvPr>
@@ -4229,8 +4771,8 @@
         </p:blipFill>
         <p:spPr bwMode="auto">
           <a:xfrm>
-            <a:off x="450209" y="1690688"/>
-            <a:ext cx="11291582" cy="3608013"/>
+            <a:off x="173372" y="1690688"/>
+            <a:ext cx="11845255" cy="3911402"/>
           </a:xfrm>
           <a:prstGeom prst="rect">
             <a:avLst/>
@@ -4307,10 +4849,10 @@
       </p:sp>
       <p:pic>
         <p:nvPicPr>
-          <p:cNvPr id="7170" name="Picture 2">
-            <a:extLst>
-              <a:ext uri="{FF2B5EF4-FFF2-40B4-BE49-F238E27FC236}">
-                <a16:creationId xmlns:a16="http://schemas.microsoft.com/office/drawing/2014/main" id="{E61F79F3-BAA6-4B9F-85E2-AFFD32F45B42}"/>
+          <p:cNvPr id="3" name="Picture 2">
+            <a:extLst>
+              <a:ext uri="{FF2B5EF4-FFF2-40B4-BE49-F238E27FC236}">
+                <a16:creationId xmlns:a16="http://schemas.microsoft.com/office/drawing/2014/main" id="{5E4AA011-BFD8-4D2C-BBB6-BF235559AB43}"/>
               </a:ext>
             </a:extLst>
           </p:cNvPr>
@@ -4334,8 +4876,8 @@
         </p:blipFill>
         <p:spPr bwMode="auto">
           <a:xfrm>
-            <a:off x="341152" y="1690688"/>
-            <a:ext cx="11509695" cy="3677707"/>
+            <a:off x="428095" y="1690688"/>
+            <a:ext cx="11335810" cy="3743179"/>
           </a:xfrm>
           <a:prstGeom prst="rect">
             <a:avLst/>
@@ -4412,10 +4954,10 @@
       </p:sp>
       <p:pic>
         <p:nvPicPr>
-          <p:cNvPr id="8194" name="Picture 2">
-            <a:extLst>
-              <a:ext uri="{FF2B5EF4-FFF2-40B4-BE49-F238E27FC236}">
-                <a16:creationId xmlns:a16="http://schemas.microsoft.com/office/drawing/2014/main" id="{DE41EA7C-0478-4D1E-9F42-2BE9F2927C44}"/>
+          <p:cNvPr id="9224" name="Picture 8">
+            <a:extLst>
+              <a:ext uri="{FF2B5EF4-FFF2-40B4-BE49-F238E27FC236}">
+                <a16:creationId xmlns:a16="http://schemas.microsoft.com/office/drawing/2014/main" id="{75A2A548-9DBB-4A84-9717-30576638C807}"/>
               </a:ext>
             </a:extLst>
           </p:cNvPr>
@@ -4439,8 +4981,8 @@
         </p:blipFill>
         <p:spPr bwMode="auto">
           <a:xfrm>
-            <a:off x="2133600" y="1690688"/>
-            <a:ext cx="7924800" cy="4572000"/>
+            <a:off x="1600200" y="1690688"/>
+            <a:ext cx="8991600" cy="4724400"/>
           </a:xfrm>
           <a:prstGeom prst="rect">
             <a:avLst/>
@@ -4517,10 +5059,10 @@
       </p:sp>
       <p:pic>
         <p:nvPicPr>
-          <p:cNvPr id="9218" name="Picture 2">
-            <a:extLst>
-              <a:ext uri="{FF2B5EF4-FFF2-40B4-BE49-F238E27FC236}">
-                <a16:creationId xmlns:a16="http://schemas.microsoft.com/office/drawing/2014/main" id="{359388E3-4469-4D17-8436-19B00DC19B80}"/>
+          <p:cNvPr id="10242" name="Picture 2">
+            <a:extLst>
+              <a:ext uri="{FF2B5EF4-FFF2-40B4-BE49-F238E27FC236}">
+                <a16:creationId xmlns:a16="http://schemas.microsoft.com/office/drawing/2014/main" id="{BB516385-4C2D-41EA-AE9B-3DFF2A6FEB49}"/>
               </a:ext>
             </a:extLst>
           </p:cNvPr>
@@ -4544,8 +5086,8 @@
         </p:blipFill>
         <p:spPr bwMode="auto">
           <a:xfrm>
-            <a:off x="2133600" y="1690688"/>
-            <a:ext cx="7924800" cy="4572000"/>
+            <a:off x="1600200" y="1690688"/>
+            <a:ext cx="8991600" cy="4724400"/>
           </a:xfrm>
           <a:prstGeom prst="rect">
             <a:avLst/>

</xml_diff>